<commit_message>
Updated UE4 builds slides, TODO - Different deployment types
</commit_message>
<xml_diff>
--- a/COMP350/COMP350 Prep 2/COMP350 -  Prep 02.pptx
+++ b/COMP350/COMP350 Prep 2/COMP350 -  Prep 02.pptx
@@ -5,10 +5,10 @@
     <p:sldMasterId id="2147483648" r:id="rId1"/>
   </p:sldMasterIdLst>
   <p:notesMasterIdLst>
-    <p:notesMasterId r:id="rId22"/>
+    <p:notesMasterId r:id="rId25"/>
   </p:notesMasterIdLst>
   <p:handoutMasterIdLst>
-    <p:handoutMasterId r:id="rId23"/>
+    <p:handoutMasterId r:id="rId26"/>
   </p:handoutMasterIdLst>
   <p:sldIdLst>
     <p:sldId id="257" r:id="rId2"/>
@@ -25,12 +25,15 @@
     <p:sldId id="351" r:id="rId13"/>
     <p:sldId id="352" r:id="rId14"/>
     <p:sldId id="345" r:id="rId15"/>
-    <p:sldId id="341" r:id="rId16"/>
-    <p:sldId id="353" r:id="rId17"/>
-    <p:sldId id="354" r:id="rId18"/>
-    <p:sldId id="355" r:id="rId19"/>
-    <p:sldId id="356" r:id="rId20"/>
-    <p:sldId id="357" r:id="rId21"/>
+    <p:sldId id="358" r:id="rId16"/>
+    <p:sldId id="359" r:id="rId17"/>
+    <p:sldId id="360" r:id="rId18"/>
+    <p:sldId id="341" r:id="rId19"/>
+    <p:sldId id="353" r:id="rId20"/>
+    <p:sldId id="354" r:id="rId21"/>
+    <p:sldId id="355" r:id="rId22"/>
+    <p:sldId id="356" r:id="rId23"/>
+    <p:sldId id="357" r:id="rId24"/>
   </p:sldIdLst>
   <p:sldSz cx="9144000" cy="6858000" type="screen4x3"/>
   <p:notesSz cx="7315200" cy="9601200"/>
@@ -129,6 +132,36 @@
       </a:defRPr>
     </a:lvl9pPr>
   </p:defaultTextStyle>
+  <p:extLst>
+    <p:ext uri="{EFAFB233-063F-42B5-8137-9DF3F51BA10A}">
+      <p15:sldGuideLst xmlns:p15="http://schemas.microsoft.com/office/powerpoint/2012/main">
+        <p15:guide id="1" orient="horz" pos="2160">
+          <p15:clr>
+            <a:srgbClr val="A4A3A4"/>
+          </p15:clr>
+        </p15:guide>
+        <p15:guide id="2" pos="2880">
+          <p15:clr>
+            <a:srgbClr val="A4A3A4"/>
+          </p15:clr>
+        </p15:guide>
+      </p15:sldGuideLst>
+    </p:ext>
+    <p:ext uri="{2D200454-40CA-4A62-9FC3-DE9A4176ACB9}">
+      <p15:notesGuideLst xmlns:p15="http://schemas.microsoft.com/office/powerpoint/2012/main">
+        <p15:guide id="1" orient="horz" pos="3024">
+          <p15:clr>
+            <a:srgbClr val="A4A3A4"/>
+          </p15:clr>
+        </p15:guide>
+        <p15:guide id="2" pos="2304">
+          <p15:clr>
+            <a:srgbClr val="A4A3A4"/>
+          </p15:clr>
+        </p15:guide>
+      </p15:notesGuideLst>
+    </p:ext>
+  </p:extLst>
 </p:presentation>
 </file>
 
@@ -215,7 +248,7 @@
             <a:fld id="{134C908B-E4CF-4B88-8994-49C91B4DAC10}" type="datetimeFigureOut">
               <a:rPr lang="en-US" smtClean="0"/>
               <a:pPr/>
-              <a:t>12/10/2018</a:t>
+              <a:t>12/11/2018</a:t>
             </a:fld>
             <a:endParaRPr lang="en-US"/>
           </a:p>
@@ -377,7 +410,7 @@
             <a:fld id="{FCD4ED34-E2A7-4A73-B53B-08CB721EE63F}" type="datetimeFigureOut">
               <a:rPr lang="en-US" smtClean="0"/>
               <a:pPr/>
-              <a:t>12/10/2018</a:t>
+              <a:t>12/11/2018</a:t>
             </a:fld>
             <a:endParaRPr lang="en-GB"/>
           </a:p>
@@ -842,7 +875,7 @@
             <a:fld id="{24C0EDFE-3590-4448-BF7B-7FB41E82085F}" type="datetimeFigureOut">
               <a:rPr lang="en-US" smtClean="0"/>
               <a:pPr/>
-              <a:t>12/10/2018</a:t>
+              <a:t>12/11/2018</a:t>
             </a:fld>
             <a:endParaRPr lang="en-US" dirty="0"/>
           </a:p>
@@ -1033,7 +1066,7 @@
             <a:fld id="{24C0EDFE-3590-4448-BF7B-7FB41E82085F}" type="datetimeFigureOut">
               <a:rPr lang="en-US" smtClean="0"/>
               <a:pPr/>
-              <a:t>12/10/2018</a:t>
+              <a:t>12/11/2018</a:t>
             </a:fld>
             <a:endParaRPr lang="en-US" dirty="0"/>
           </a:p>
@@ -1213,7 +1246,7 @@
             <a:fld id="{24C0EDFE-3590-4448-BF7B-7FB41E82085F}" type="datetimeFigureOut">
               <a:rPr lang="en-US" smtClean="0"/>
               <a:pPr/>
-              <a:t>12/10/2018</a:t>
+              <a:t>12/11/2018</a:t>
             </a:fld>
             <a:endParaRPr lang="en-US" dirty="0"/>
           </a:p>
@@ -1463,7 +1496,7 @@
             <a:fld id="{24C0EDFE-3590-4448-BF7B-7FB41E82085F}" type="datetimeFigureOut">
               <a:rPr lang="en-US" smtClean="0"/>
               <a:pPr/>
-              <a:t>12/10/2018</a:t>
+              <a:t>12/11/2018</a:t>
             </a:fld>
             <a:endParaRPr lang="en-US" dirty="0"/>
           </a:p>
@@ -1786,7 +1819,7 @@
             <a:fld id="{24C0EDFE-3590-4448-BF7B-7FB41E82085F}" type="datetimeFigureOut">
               <a:rPr lang="en-US" smtClean="0"/>
               <a:pPr/>
-              <a:t>12/10/2018</a:t>
+              <a:t>12/11/2018</a:t>
             </a:fld>
             <a:endParaRPr lang="en-US" dirty="0"/>
           </a:p>
@@ -2095,7 +2128,7 @@
             <a:fld id="{24C0EDFE-3590-4448-BF7B-7FB41E82085F}" type="datetimeFigureOut">
               <a:rPr lang="en-US" smtClean="0"/>
               <a:pPr/>
-              <a:t>12/10/2018</a:t>
+              <a:t>12/11/2018</a:t>
             </a:fld>
             <a:endParaRPr lang="en-US" dirty="0"/>
           </a:p>
@@ -2522,7 +2555,7 @@
             <a:fld id="{24C0EDFE-3590-4448-BF7B-7FB41E82085F}" type="datetimeFigureOut">
               <a:rPr lang="en-US" smtClean="0"/>
               <a:pPr/>
-              <a:t>12/10/2018</a:t>
+              <a:t>12/11/2018</a:t>
             </a:fld>
             <a:endParaRPr lang="en-US" dirty="0"/>
           </a:p>
@@ -2645,7 +2678,7 @@
             <a:fld id="{24C0EDFE-3590-4448-BF7B-7FB41E82085F}" type="datetimeFigureOut">
               <a:rPr lang="en-US" smtClean="0"/>
               <a:pPr/>
-              <a:t>12/10/2018</a:t>
+              <a:t>12/11/2018</a:t>
             </a:fld>
             <a:endParaRPr lang="en-US" dirty="0"/>
           </a:p>
@@ -2737,7 +2770,7 @@
             <a:fld id="{24C0EDFE-3590-4448-BF7B-7FB41E82085F}" type="datetimeFigureOut">
               <a:rPr lang="en-US" smtClean="0"/>
               <a:pPr/>
-              <a:t>12/10/2018</a:t>
+              <a:t>12/11/2018</a:t>
             </a:fld>
             <a:endParaRPr lang="en-US" dirty="0"/>
           </a:p>
@@ -3014,7 +3047,7 @@
             <a:fld id="{24C0EDFE-3590-4448-BF7B-7FB41E82085F}" type="datetimeFigureOut">
               <a:rPr lang="en-US" smtClean="0"/>
               <a:pPr/>
-              <a:t>12/10/2018</a:t>
+              <a:t>12/11/2018</a:t>
             </a:fld>
             <a:endParaRPr lang="en-US" dirty="0"/>
           </a:p>
@@ -3267,7 +3300,7 @@
             <a:fld id="{24C0EDFE-3590-4448-BF7B-7FB41E82085F}" type="datetimeFigureOut">
               <a:rPr lang="en-US" smtClean="0"/>
               <a:pPr/>
-              <a:t>12/10/2018</a:t>
+              <a:t>12/11/2018</a:t>
             </a:fld>
             <a:endParaRPr lang="en-US" dirty="0"/>
           </a:p>
@@ -3445,7 +3478,7 @@
             <a:fld id="{24C0EDFE-3590-4448-BF7B-7FB41E82085F}" type="datetimeFigureOut">
               <a:rPr lang="en-US" smtClean="0"/>
               <a:pPr/>
-              <a:t>12/10/2018</a:t>
+              <a:t>12/11/2018</a:t>
             </a:fld>
             <a:endParaRPr lang="en-US" dirty="0"/>
           </a:p>
@@ -5326,8 +5359,45 @@
             <a:pPr lvl="1"/>
             <a:r>
               <a:rPr lang="en-GB" dirty="0" smtClean="0"/>
-              <a:t>Brian</a:t>
-            </a:r>
+              <a:t>There are three ways to deploy your project</a:t>
+            </a:r>
+          </a:p>
+          <a:p>
+            <a:pPr marL="1371600" lvl="2" indent="-457200">
+              <a:buFont typeface="+mj-lt"/>
+              <a:buAutoNum type="arabicPeriod"/>
+            </a:pPr>
+            <a:r>
+              <a:rPr lang="en-GB" dirty="0" smtClean="0"/>
+              <a:t>Launcher</a:t>
+            </a:r>
+          </a:p>
+          <a:p>
+            <a:pPr marL="1371600" lvl="2" indent="-457200">
+              <a:buFont typeface="+mj-lt"/>
+              <a:buAutoNum type="arabicPeriod"/>
+            </a:pPr>
+            <a:r>
+              <a:rPr lang="en-GB" dirty="0" smtClean="0"/>
+              <a:t>Cook by the book</a:t>
+            </a:r>
+          </a:p>
+          <a:p>
+            <a:pPr marL="1371600" lvl="2" indent="-457200">
+              <a:buFont typeface="+mj-lt"/>
+              <a:buAutoNum type="arabicPeriod"/>
+            </a:pPr>
+            <a:r>
+              <a:rPr lang="en-GB" dirty="0" smtClean="0"/>
+              <a:t>Cook on the fly </a:t>
+            </a:r>
+          </a:p>
+          <a:p>
+            <a:pPr marL="1371600" lvl="2" indent="-457200">
+              <a:buFont typeface="+mj-lt"/>
+              <a:buAutoNum type="arabicPeriod"/>
+            </a:pPr>
+            <a:endParaRPr lang="en-GB" dirty="0" smtClean="0"/>
           </a:p>
           <a:p>
             <a:pPr lvl="1"/>
@@ -5390,13 +5460,22 @@
           <a:p>
             <a:r>
               <a:rPr lang="en-GB" dirty="0" smtClean="0"/>
-              <a:t>Android development with Unity</a:t>
-            </a:r>
-          </a:p>
-          <a:p>
-            <a:pPr lvl="1">
-              <a:buNone/>
-            </a:pPr>
+              <a:t>PS4 development with Unreal</a:t>
+            </a:r>
+          </a:p>
+          <a:p>
+            <a:pPr lvl="1"/>
+            <a:r>
+              <a:rPr lang="en-GB" dirty="0" smtClean="0"/>
+              <a:t>Regardless of deployment method you need to connect to the dev kit</a:t>
+            </a:r>
+            <a:endParaRPr lang="en-GB" dirty="0"/>
+          </a:p>
+          <a:p>
+            <a:r>
+              <a:rPr lang="en-GB" dirty="0" smtClean="0"/>
+              <a:t>Network Neighbourhood</a:t>
+            </a:r>
             <a:endParaRPr lang="en-GB" dirty="0" smtClean="0"/>
           </a:p>
           <a:p>
@@ -5409,7 +5488,36 @@
           </a:p>
         </p:txBody>
       </p:sp>
+      <p:pic>
+        <p:nvPicPr>
+          <p:cNvPr id="5" name="Picture 4"/>
+          <p:cNvPicPr>
+            <a:picLocks noChangeAspect="1"/>
+          </p:cNvPicPr>
+          <p:nvPr/>
+        </p:nvPicPr>
+        <p:blipFill>
+          <a:blip r:embed="rId2"/>
+          <a:stretch>
+            <a:fillRect/>
+          </a:stretch>
+        </p:blipFill>
+        <p:spPr>
+          <a:xfrm>
+            <a:off x="899592" y="2780928"/>
+            <a:ext cx="7713424" cy="3096344"/>
+          </a:xfrm>
+          <a:prstGeom prst="rect">
+            <a:avLst/>
+          </a:prstGeom>
+        </p:spPr>
+      </p:pic>
     </p:spTree>
+    <p:extLst>
+      <p:ext uri="{BB962C8B-B14F-4D97-AF65-F5344CB8AC3E}">
+        <p14:creationId xmlns:p14="http://schemas.microsoft.com/office/powerpoint/2010/main" val="940426325"/>
+      </p:ext>
+    </p:extLst>
   </p:cSld>
   <p:clrMapOvr>
     <a:masterClrMapping/>
@@ -5451,12 +5559,7 @@
             <p:ph idx="1"/>
           </p:nvPr>
         </p:nvSpPr>
-        <p:spPr>
-          <a:xfrm>
-            <a:off x="457200" y="548680"/>
-            <a:ext cx="8229600" cy="6120680"/>
-          </a:xfrm>
-        </p:spPr>
+        <p:spPr/>
         <p:txBody>
           <a:bodyPr>
             <a:normAutofit/>
@@ -5465,53 +5568,223 @@
           <a:p>
             <a:r>
               <a:rPr lang="en-GB" dirty="0" smtClean="0"/>
+              <a:t>PS4 development with Unreal</a:t>
+            </a:r>
+          </a:p>
+          <a:p>
+            <a:pPr lvl="1"/>
+            <a:r>
+              <a:rPr lang="en-GB" dirty="0" smtClean="0"/>
+              <a:t>Regardless of deployment method you need to connect to the dev kit</a:t>
+            </a:r>
+            <a:endParaRPr lang="en-GB" dirty="0"/>
+          </a:p>
+          <a:p>
+            <a:r>
+              <a:rPr lang="en-GB" dirty="0" smtClean="0"/>
+              <a:t>Device Manager in UE4</a:t>
+            </a:r>
+          </a:p>
+          <a:p>
+            <a:pPr marL="0" indent="0">
+              <a:buNone/>
+            </a:pPr>
+            <a:endParaRPr lang="en-GB" dirty="0" smtClean="0"/>
+          </a:p>
+          <a:p>
+            <a:pPr lvl="1"/>
+            <a:endParaRPr lang="en-GB" dirty="0" smtClean="0"/>
+          </a:p>
+          <a:p>
+            <a:pPr lvl="1"/>
+            <a:endParaRPr lang="en-GB" dirty="0" smtClean="0"/>
+          </a:p>
+        </p:txBody>
+      </p:sp>
+      <p:pic>
+        <p:nvPicPr>
+          <p:cNvPr id="4" name="Picture 3"/>
+          <p:cNvPicPr>
+            <a:picLocks noChangeAspect="1"/>
+          </p:cNvPicPr>
+          <p:nvPr/>
+        </p:nvPicPr>
+        <p:blipFill>
+          <a:blip r:embed="rId2"/>
+          <a:stretch>
+            <a:fillRect/>
+          </a:stretch>
+        </p:blipFill>
+        <p:spPr>
+          <a:xfrm>
+            <a:off x="909936" y="2708920"/>
+            <a:ext cx="7776864" cy="3270858"/>
+          </a:xfrm>
+          <a:prstGeom prst="rect">
+            <a:avLst/>
+          </a:prstGeom>
+        </p:spPr>
+      </p:pic>
+    </p:spTree>
+    <p:extLst>
+      <p:ext uri="{BB962C8B-B14F-4D97-AF65-F5344CB8AC3E}">
+        <p14:creationId xmlns:p14="http://schemas.microsoft.com/office/powerpoint/2010/main" val="441671852"/>
+      </p:ext>
+    </p:extLst>
+  </p:cSld>
+  <p:clrMapOvr>
+    <a:masterClrMapping/>
+  </p:clrMapOvr>
+  <p:timing>
+    <p:tnLst>
+      <p:par>
+        <p:cTn id="1" dur="indefinite" restart="never" nodeType="tmRoot"/>
+      </p:par>
+    </p:tnLst>
+  </p:timing>
+</p:sld>
+</file>
+
+<file path=ppt/slides/slide17.xml><?xml version="1.0" encoding="utf-8"?>
+<p:sld xmlns:a="http://schemas.openxmlformats.org/drawingml/2006/main" xmlns:r="http://schemas.openxmlformats.org/officeDocument/2006/relationships" xmlns:p="http://schemas.openxmlformats.org/presentationml/2006/main">
+  <p:cSld>
+    <p:spTree>
+      <p:nvGrpSpPr>
+        <p:cNvPr id="1" name=""/>
+        <p:cNvGrpSpPr/>
+        <p:nvPr/>
+      </p:nvGrpSpPr>
+      <p:grpSpPr>
+        <a:xfrm>
+          <a:off x="0" y="0"/>
+          <a:ext cx="0" cy="0"/>
+          <a:chOff x="0" y="0"/>
+          <a:chExt cx="0" cy="0"/>
+        </a:xfrm>
+      </p:grpSpPr>
+      <p:sp>
+        <p:nvSpPr>
+          <p:cNvPr id="3" name="Content Placeholder 2"/>
+          <p:cNvSpPr>
+            <a:spLocks noGrp="1"/>
+          </p:cNvSpPr>
+          <p:nvPr>
+            <p:ph idx="1"/>
+          </p:nvPr>
+        </p:nvSpPr>
+        <p:spPr/>
+        <p:txBody>
+          <a:bodyPr>
+            <a:normAutofit/>
+          </a:bodyPr>
+          <a:lstStyle/>
+          <a:p>
+            <a:r>
+              <a:rPr lang="en-GB" dirty="0" smtClean="0"/>
+              <a:t>Deployment via the Launcher in UE4</a:t>
+            </a:r>
+          </a:p>
+          <a:p>
+            <a:pPr marL="914400" lvl="1" indent="-514350">
+              <a:buFont typeface="+mj-lt"/>
+              <a:buAutoNum type="arabicPeriod"/>
+            </a:pPr>
+            <a:r>
+              <a:rPr lang="en-GB" sz="2400" dirty="0" smtClean="0"/>
+              <a:t>Open your project in UE4</a:t>
+            </a:r>
+            <a:endParaRPr lang="en-GB" sz="2400" dirty="0"/>
+          </a:p>
+          <a:p>
+            <a:pPr marL="914400" lvl="1" indent="-514350">
+              <a:buFont typeface="+mj-lt"/>
+              <a:buAutoNum type="arabicPeriod"/>
+            </a:pPr>
+            <a:r>
+              <a:rPr lang="en-GB" sz="2400" dirty="0" smtClean="0"/>
+              <a:t>Under the launch menu, select the Dev Kit</a:t>
+            </a:r>
+          </a:p>
+          <a:p>
+            <a:pPr marL="914400" lvl="1" indent="-514350">
+              <a:buFont typeface="+mj-lt"/>
+              <a:buAutoNum type="arabicPeriod"/>
+            </a:pPr>
+            <a:r>
+              <a:rPr lang="en-GB" sz="2400" dirty="0" smtClean="0"/>
+              <a:t>This will cook and then deploy your game to the PS4</a:t>
+            </a:r>
+          </a:p>
+          <a:p>
+            <a:r>
+              <a:rPr lang="en-GB" dirty="0" smtClean="0"/>
+              <a:t>This is the slowest</a:t>
+            </a:r>
+            <a:endParaRPr lang="en-GB" dirty="0" smtClean="0"/>
+          </a:p>
+          <a:p>
+            <a:pPr lvl="1"/>
+            <a:endParaRPr lang="en-GB" dirty="0" smtClean="0"/>
+          </a:p>
+        </p:txBody>
+      </p:sp>
+    </p:spTree>
+    <p:extLst>
+      <p:ext uri="{BB962C8B-B14F-4D97-AF65-F5344CB8AC3E}">
+        <p14:creationId xmlns:p14="http://schemas.microsoft.com/office/powerpoint/2010/main" val="1114931698"/>
+      </p:ext>
+    </p:extLst>
+  </p:cSld>
+  <p:clrMapOvr>
+    <a:masterClrMapping/>
+  </p:clrMapOvr>
+  <p:timing>
+    <p:tnLst>
+      <p:par>
+        <p:cTn id="1" dur="indefinite" restart="never" nodeType="tmRoot"/>
+      </p:par>
+    </p:tnLst>
+  </p:timing>
+</p:sld>
+</file>
+
+<file path=ppt/slides/slide18.xml><?xml version="1.0" encoding="utf-8"?>
+<p:sld xmlns:a="http://schemas.openxmlformats.org/drawingml/2006/main" xmlns:r="http://schemas.openxmlformats.org/officeDocument/2006/relationships" xmlns:p="http://schemas.openxmlformats.org/presentationml/2006/main">
+  <p:cSld>
+    <p:spTree>
+      <p:nvGrpSpPr>
+        <p:cNvPr id="1" name=""/>
+        <p:cNvGrpSpPr/>
+        <p:nvPr/>
+      </p:nvGrpSpPr>
+      <p:grpSpPr>
+        <a:xfrm>
+          <a:off x="0" y="0"/>
+          <a:ext cx="0" cy="0"/>
+          <a:chOff x="0" y="0"/>
+          <a:chExt cx="0" cy="0"/>
+        </a:xfrm>
+      </p:grpSpPr>
+      <p:sp>
+        <p:nvSpPr>
+          <p:cNvPr id="3" name="Content Placeholder 2"/>
+          <p:cNvSpPr>
+            <a:spLocks noGrp="1"/>
+          </p:cNvSpPr>
+          <p:nvPr>
+            <p:ph idx="1"/>
+          </p:nvPr>
+        </p:nvSpPr>
+        <p:spPr/>
+        <p:txBody>
+          <a:bodyPr>
+            <a:normAutofit/>
+          </a:bodyPr>
+          <a:lstStyle/>
+          <a:p>
+            <a:r>
+              <a:rPr lang="en-GB" dirty="0" smtClean="0"/>
               <a:t>Android development with Unity</a:t>
-            </a:r>
-          </a:p>
-          <a:p>
-            <a:pPr lvl="1"/>
-            <a:r>
-              <a:rPr lang="en-GB" dirty="0" smtClean="0"/>
-              <a:t>Unity also supports Android / </a:t>
-            </a:r>
-            <a:r>
-              <a:rPr lang="en-GB" dirty="0" err="1" smtClean="0"/>
-              <a:t>iOS</a:t>
-            </a:r>
-            <a:r>
-              <a:rPr lang="en-GB" dirty="0" smtClean="0"/>
-              <a:t> development</a:t>
-            </a:r>
-          </a:p>
-          <a:p>
-            <a:pPr lvl="2"/>
-            <a:r>
-              <a:rPr lang="en-GB" dirty="0" smtClean="0"/>
-              <a:t>Android is ‘easier’ as you don’t need a Mac as part of the build process</a:t>
-            </a:r>
-          </a:p>
-          <a:p>
-            <a:pPr lvl="2"/>
-            <a:r>
-              <a:rPr lang="en-GB" dirty="0" smtClean="0"/>
-              <a:t>This link explains what to do to install Android SDK</a:t>
-            </a:r>
-          </a:p>
-          <a:p>
-            <a:pPr lvl="3"/>
-            <a:r>
-              <a:rPr lang="en-GB" dirty="0" smtClean="0">
-                <a:hlinkClick r:id="rId2"/>
-              </a:rPr>
-              <a:t>https://docs.unity3d.com/Manual/android-sdksetup.html</a:t>
-            </a:r>
-            <a:endParaRPr lang="en-GB" dirty="0" smtClean="0"/>
-          </a:p>
-          <a:p>
-            <a:pPr lvl="3"/>
-            <a:r>
-              <a:rPr lang="en-GB" dirty="0" smtClean="0"/>
-              <a:t>Includes adding Android Studio</a:t>
             </a:r>
           </a:p>
           <a:p>
@@ -5545,7 +5818,213 @@
 </p:sld>
 </file>
 
-<file path=ppt/slides/slide17.xml><?xml version="1.0" encoding="utf-8"?>
+<file path=ppt/slides/slide19.xml><?xml version="1.0" encoding="utf-8"?>
+<p:sld xmlns:a="http://schemas.openxmlformats.org/drawingml/2006/main" xmlns:r="http://schemas.openxmlformats.org/officeDocument/2006/relationships" xmlns:p="http://schemas.openxmlformats.org/presentationml/2006/main">
+  <p:cSld>
+    <p:spTree>
+      <p:nvGrpSpPr>
+        <p:cNvPr id="1" name=""/>
+        <p:cNvGrpSpPr/>
+        <p:nvPr/>
+      </p:nvGrpSpPr>
+      <p:grpSpPr>
+        <a:xfrm>
+          <a:off x="0" y="0"/>
+          <a:ext cx="0" cy="0"/>
+          <a:chOff x="0" y="0"/>
+          <a:chExt cx="0" cy="0"/>
+        </a:xfrm>
+      </p:grpSpPr>
+      <p:sp>
+        <p:nvSpPr>
+          <p:cNvPr id="3" name="Content Placeholder 2"/>
+          <p:cNvSpPr>
+            <a:spLocks noGrp="1"/>
+          </p:cNvSpPr>
+          <p:nvPr>
+            <p:ph idx="1"/>
+          </p:nvPr>
+        </p:nvSpPr>
+        <p:spPr>
+          <a:xfrm>
+            <a:off x="457200" y="548680"/>
+            <a:ext cx="8229600" cy="6120680"/>
+          </a:xfrm>
+        </p:spPr>
+        <p:txBody>
+          <a:bodyPr>
+            <a:normAutofit/>
+          </a:bodyPr>
+          <a:lstStyle/>
+          <a:p>
+            <a:r>
+              <a:rPr lang="en-GB" dirty="0" smtClean="0"/>
+              <a:t>Android development with Unity</a:t>
+            </a:r>
+          </a:p>
+          <a:p>
+            <a:pPr lvl="1"/>
+            <a:r>
+              <a:rPr lang="en-GB" dirty="0" smtClean="0"/>
+              <a:t>Unity also supports Android / </a:t>
+            </a:r>
+            <a:r>
+              <a:rPr lang="en-GB" dirty="0" err="1" smtClean="0"/>
+              <a:t>iOS</a:t>
+            </a:r>
+            <a:r>
+              <a:rPr lang="en-GB" dirty="0" smtClean="0"/>
+              <a:t> development</a:t>
+            </a:r>
+          </a:p>
+          <a:p>
+            <a:pPr lvl="2"/>
+            <a:r>
+              <a:rPr lang="en-GB" dirty="0" smtClean="0"/>
+              <a:t>Android is ‘easier’ as you don’t need a Mac as part of the build process</a:t>
+            </a:r>
+          </a:p>
+          <a:p>
+            <a:pPr lvl="2"/>
+            <a:r>
+              <a:rPr lang="en-GB" dirty="0" smtClean="0"/>
+              <a:t>This link explains what to do to install Android SDK</a:t>
+            </a:r>
+          </a:p>
+          <a:p>
+            <a:pPr lvl="3"/>
+            <a:r>
+              <a:rPr lang="en-GB" dirty="0" smtClean="0">
+                <a:hlinkClick r:id="rId2"/>
+              </a:rPr>
+              <a:t>https://docs.unity3d.com/Manual/android-sdksetup.html</a:t>
+            </a:r>
+            <a:endParaRPr lang="en-GB" dirty="0" smtClean="0"/>
+          </a:p>
+          <a:p>
+            <a:pPr lvl="3"/>
+            <a:r>
+              <a:rPr lang="en-GB" dirty="0" smtClean="0"/>
+              <a:t>Includes adding Android Studio</a:t>
+            </a:r>
+          </a:p>
+          <a:p>
+            <a:pPr lvl="1">
+              <a:buNone/>
+            </a:pPr>
+            <a:endParaRPr lang="en-GB" dirty="0" smtClean="0"/>
+          </a:p>
+          <a:p>
+            <a:pPr lvl="1"/>
+            <a:endParaRPr lang="en-GB" dirty="0" smtClean="0"/>
+          </a:p>
+          <a:p>
+            <a:pPr lvl="1"/>
+            <a:endParaRPr lang="en-GB" dirty="0" smtClean="0"/>
+          </a:p>
+        </p:txBody>
+      </p:sp>
+    </p:spTree>
+  </p:cSld>
+  <p:clrMapOvr>
+    <a:masterClrMapping/>
+  </p:clrMapOvr>
+  <p:timing>
+    <p:tnLst>
+      <p:par>
+        <p:cTn id="1" dur="indefinite" restart="never" nodeType="tmRoot"/>
+      </p:par>
+    </p:tnLst>
+  </p:timing>
+</p:sld>
+</file>
+
+<file path=ppt/slides/slide2.xml><?xml version="1.0" encoding="utf-8"?>
+<p:sld xmlns:a="http://schemas.openxmlformats.org/drawingml/2006/main" xmlns:r="http://schemas.openxmlformats.org/officeDocument/2006/relationships" xmlns:p="http://schemas.openxmlformats.org/presentationml/2006/main">
+  <p:cSld>
+    <p:spTree>
+      <p:nvGrpSpPr>
+        <p:cNvPr id="1" name=""/>
+        <p:cNvGrpSpPr/>
+        <p:nvPr/>
+      </p:nvGrpSpPr>
+      <p:grpSpPr>
+        <a:xfrm>
+          <a:off x="0" y="0"/>
+          <a:ext cx="0" cy="0"/>
+          <a:chOff x="0" y="0"/>
+          <a:chExt cx="0" cy="0"/>
+        </a:xfrm>
+      </p:grpSpPr>
+      <p:sp>
+        <p:nvSpPr>
+          <p:cNvPr id="3" name="Content Placeholder 2"/>
+          <p:cNvSpPr>
+            <a:spLocks noGrp="1"/>
+          </p:cNvSpPr>
+          <p:nvPr>
+            <p:ph idx="1"/>
+          </p:nvPr>
+        </p:nvSpPr>
+        <p:spPr/>
+        <p:txBody>
+          <a:bodyPr>
+            <a:normAutofit/>
+          </a:bodyPr>
+          <a:lstStyle/>
+          <a:p>
+            <a:r>
+              <a:rPr lang="en-GB" dirty="0" smtClean="0"/>
+              <a:t>Today’s lecture:</a:t>
+            </a:r>
+          </a:p>
+          <a:p>
+            <a:pPr lvl="1"/>
+            <a:r>
+              <a:rPr lang="en-GB" dirty="0" smtClean="0"/>
+              <a:t>PS4 development with Unity</a:t>
+            </a:r>
+          </a:p>
+          <a:p>
+            <a:pPr lvl="1"/>
+            <a:r>
+              <a:rPr lang="en-GB" dirty="0" smtClean="0"/>
+              <a:t>PS4 development with Unreal</a:t>
+            </a:r>
+          </a:p>
+          <a:p>
+            <a:pPr lvl="1"/>
+            <a:r>
+              <a:rPr lang="en-GB" dirty="0" smtClean="0"/>
+              <a:t>Android development with Unity</a:t>
+            </a:r>
+          </a:p>
+          <a:p>
+            <a:pPr lvl="1"/>
+            <a:endParaRPr lang="en-GB" dirty="0" smtClean="0"/>
+          </a:p>
+          <a:p>
+            <a:pPr lvl="1"/>
+            <a:endParaRPr lang="en-GB" dirty="0" smtClean="0"/>
+          </a:p>
+        </p:txBody>
+      </p:sp>
+    </p:spTree>
+  </p:cSld>
+  <p:clrMapOvr>
+    <a:masterClrMapping/>
+  </p:clrMapOvr>
+  <p:timing>
+    <p:tnLst>
+      <p:par>
+        <p:cTn id="1" dur="indefinite" restart="never" nodeType="tmRoot"/>
+      </p:par>
+    </p:tnLst>
+  </p:timing>
+</p:sld>
+</file>
+
+<file path=ppt/slides/slide20.xml><?xml version="1.0" encoding="utf-8"?>
 <p:sld xmlns:a="http://schemas.openxmlformats.org/drawingml/2006/main" xmlns:r="http://schemas.openxmlformats.org/officeDocument/2006/relationships" xmlns:p="http://schemas.openxmlformats.org/presentationml/2006/main">
   <p:cSld>
     <p:spTree>
@@ -5681,7 +6160,7 @@
 </p:sld>
 </file>
 
-<file path=ppt/slides/slide18.xml><?xml version="1.0" encoding="utf-8"?>
+<file path=ppt/slides/slide21.xml><?xml version="1.0" encoding="utf-8"?>
 <p:sld xmlns:a="http://schemas.openxmlformats.org/drawingml/2006/main" xmlns:r="http://schemas.openxmlformats.org/officeDocument/2006/relationships" xmlns:p="http://schemas.openxmlformats.org/presentationml/2006/main">
   <p:cSld>
     <p:spTree>
@@ -5798,7 +6277,7 @@
 </p:sld>
 </file>
 
-<file path=ppt/slides/slide19.xml><?xml version="1.0" encoding="utf-8"?>
+<file path=ppt/slides/slide22.xml><?xml version="1.0" encoding="utf-8"?>
 <p:sld xmlns:a="http://schemas.openxmlformats.org/drawingml/2006/main" xmlns:r="http://schemas.openxmlformats.org/officeDocument/2006/relationships" xmlns:p="http://schemas.openxmlformats.org/presentationml/2006/main">
   <p:cSld>
     <p:spTree>
@@ -5841,7 +6320,6 @@
               <a:rPr lang="en-GB" dirty="0" smtClean="0"/>
               <a:t>Developing for non-PC targets</a:t>
             </a:r>
-            <a:endParaRPr lang="en-GB" dirty="0" smtClean="0"/>
           </a:p>
           <a:p>
             <a:pPr lvl="1"/>
@@ -5849,7 +6327,6 @@
               <a:rPr lang="en-GB" dirty="0" smtClean="0"/>
               <a:t>Regardless of platform, all of these issues will be ideal to ‘document your porting process’ (Assignment 2, section B)</a:t>
             </a:r>
-            <a:endParaRPr lang="en-GB" dirty="0" smtClean="0"/>
           </a:p>
           <a:p>
             <a:pPr lvl="1">
@@ -5882,92 +6359,7 @@
 </p:sld>
 </file>
 
-<file path=ppt/slides/slide2.xml><?xml version="1.0" encoding="utf-8"?>
-<p:sld xmlns:a="http://schemas.openxmlformats.org/drawingml/2006/main" xmlns:r="http://schemas.openxmlformats.org/officeDocument/2006/relationships" xmlns:p="http://schemas.openxmlformats.org/presentationml/2006/main">
-  <p:cSld>
-    <p:spTree>
-      <p:nvGrpSpPr>
-        <p:cNvPr id="1" name=""/>
-        <p:cNvGrpSpPr/>
-        <p:nvPr/>
-      </p:nvGrpSpPr>
-      <p:grpSpPr>
-        <a:xfrm>
-          <a:off x="0" y="0"/>
-          <a:ext cx="0" cy="0"/>
-          <a:chOff x="0" y="0"/>
-          <a:chExt cx="0" cy="0"/>
-        </a:xfrm>
-      </p:grpSpPr>
-      <p:sp>
-        <p:nvSpPr>
-          <p:cNvPr id="3" name="Content Placeholder 2"/>
-          <p:cNvSpPr>
-            <a:spLocks noGrp="1"/>
-          </p:cNvSpPr>
-          <p:nvPr>
-            <p:ph idx="1"/>
-          </p:nvPr>
-        </p:nvSpPr>
-        <p:spPr/>
-        <p:txBody>
-          <a:bodyPr>
-            <a:normAutofit/>
-          </a:bodyPr>
-          <a:lstStyle/>
-          <a:p>
-            <a:r>
-              <a:rPr lang="en-GB" dirty="0" smtClean="0"/>
-              <a:t>Today’s lecture:</a:t>
-            </a:r>
-          </a:p>
-          <a:p>
-            <a:pPr lvl="1"/>
-            <a:r>
-              <a:rPr lang="en-GB" dirty="0" smtClean="0"/>
-              <a:t>PS4 development with Unity</a:t>
-            </a:r>
-          </a:p>
-          <a:p>
-            <a:pPr lvl="1"/>
-            <a:r>
-              <a:rPr lang="en-GB" dirty="0" smtClean="0"/>
-              <a:t>PS4 development with Unreal</a:t>
-            </a:r>
-          </a:p>
-          <a:p>
-            <a:pPr lvl="1"/>
-            <a:r>
-              <a:rPr lang="en-GB" dirty="0" smtClean="0"/>
-              <a:t>Android development with Unity</a:t>
-            </a:r>
-          </a:p>
-          <a:p>
-            <a:pPr lvl="1"/>
-            <a:endParaRPr lang="en-GB" dirty="0" smtClean="0"/>
-          </a:p>
-          <a:p>
-            <a:pPr lvl="1"/>
-            <a:endParaRPr lang="en-GB" dirty="0" smtClean="0"/>
-          </a:p>
-        </p:txBody>
-      </p:sp>
-    </p:spTree>
-  </p:cSld>
-  <p:clrMapOvr>
-    <a:masterClrMapping/>
-  </p:clrMapOvr>
-  <p:timing>
-    <p:tnLst>
-      <p:par>
-        <p:cTn id="1" dur="indefinite" restart="never" nodeType="tmRoot"/>
-      </p:par>
-    </p:tnLst>
-  </p:timing>
-</p:sld>
-</file>
-
-<file path=ppt/slides/slide20.xml><?xml version="1.0" encoding="utf-8"?>
+<file path=ppt/slides/slide23.xml><?xml version="1.0" encoding="utf-8"?>
 <p:sld xmlns:a="http://schemas.openxmlformats.org/drawingml/2006/main" xmlns:r="http://schemas.openxmlformats.org/officeDocument/2006/relationships" xmlns:p="http://schemas.openxmlformats.org/presentationml/2006/main">
   <p:cSld>
     <p:spTree>

</xml_diff>